<commit_message>
Add instructions and presentation update
</commit_message>
<xml_diff>
--- a/training/Agenda.pptx
+++ b/training/Agenda.pptx
@@ -5,7 +5,7 @@
     <p:sldMasterId id="2147483648" r:id="rId1"/>
   </p:sldMasterIdLst>
   <p:notesMasterIdLst>
-    <p:notesMasterId r:id="rId10"/>
+    <p:notesMasterId r:id="rId8"/>
   </p:notesMasterIdLst>
   <p:sldIdLst>
     <p:sldId id="363" r:id="rId2"/>
@@ -14,8 +14,6 @@
     <p:sldId id="415" r:id="rId5"/>
     <p:sldId id="416" r:id="rId6"/>
     <p:sldId id="417" r:id="rId7"/>
-    <p:sldId id="418" r:id="rId8"/>
-    <p:sldId id="419" r:id="rId9"/>
   </p:sldIdLst>
   <p:sldSz cx="12192000" cy="6858000"/>
   <p:notesSz cx="6858000" cy="9144000"/>
@@ -204,7 +202,7 @@
           <a:p>
             <a:fld id="{F15A6252-5F50-4106-9C23-9E03A675631E}" type="datetimeFigureOut">
               <a:rPr lang="en-IN" smtClean="0"/>
-              <a:t>28-04-2020</a:t>
+              <a:t>04-05-2020</a:t>
             </a:fld>
             <a:endParaRPr lang="en-IN"/>
           </a:p>
@@ -621,7 +619,7 @@
           <a:p>
             <a:fld id="{4086692B-153F-4DFE-BFBD-A2AE2C7443B6}" type="datetimeFigureOut">
               <a:rPr lang="en-IN" smtClean="0"/>
-              <a:t>28-04-2020</a:t>
+              <a:t>04-05-2020</a:t>
             </a:fld>
             <a:endParaRPr lang="en-IN"/>
           </a:p>
@@ -821,7 +819,7 @@
           <a:p>
             <a:fld id="{4086692B-153F-4DFE-BFBD-A2AE2C7443B6}" type="datetimeFigureOut">
               <a:rPr lang="en-IN" smtClean="0"/>
-              <a:t>28-04-2020</a:t>
+              <a:t>04-05-2020</a:t>
             </a:fld>
             <a:endParaRPr lang="en-IN"/>
           </a:p>
@@ -1031,7 +1029,7 @@
           <a:p>
             <a:fld id="{4086692B-153F-4DFE-BFBD-A2AE2C7443B6}" type="datetimeFigureOut">
               <a:rPr lang="en-IN" smtClean="0"/>
-              <a:t>28-04-2020</a:t>
+              <a:t>04-05-2020</a:t>
             </a:fld>
             <a:endParaRPr lang="en-IN"/>
           </a:p>
@@ -1231,7 +1229,7 @@
           <a:p>
             <a:fld id="{4086692B-153F-4DFE-BFBD-A2AE2C7443B6}" type="datetimeFigureOut">
               <a:rPr lang="en-IN" smtClean="0"/>
-              <a:t>28-04-2020</a:t>
+              <a:t>04-05-2020</a:t>
             </a:fld>
             <a:endParaRPr lang="en-IN"/>
           </a:p>
@@ -1507,7 +1505,7 @@
           <a:p>
             <a:fld id="{4086692B-153F-4DFE-BFBD-A2AE2C7443B6}" type="datetimeFigureOut">
               <a:rPr lang="en-IN" smtClean="0"/>
-              <a:t>28-04-2020</a:t>
+              <a:t>04-05-2020</a:t>
             </a:fld>
             <a:endParaRPr lang="en-IN"/>
           </a:p>
@@ -1775,7 +1773,7 @@
           <a:p>
             <a:fld id="{4086692B-153F-4DFE-BFBD-A2AE2C7443B6}" type="datetimeFigureOut">
               <a:rPr lang="en-IN" smtClean="0"/>
-              <a:t>28-04-2020</a:t>
+              <a:t>04-05-2020</a:t>
             </a:fld>
             <a:endParaRPr lang="en-IN"/>
           </a:p>
@@ -2190,7 +2188,7 @@
           <a:p>
             <a:fld id="{4086692B-153F-4DFE-BFBD-A2AE2C7443B6}" type="datetimeFigureOut">
               <a:rPr lang="en-IN" smtClean="0"/>
-              <a:t>28-04-2020</a:t>
+              <a:t>04-05-2020</a:t>
             </a:fld>
             <a:endParaRPr lang="en-IN"/>
           </a:p>
@@ -2332,7 +2330,7 @@
           <a:p>
             <a:fld id="{4086692B-153F-4DFE-BFBD-A2AE2C7443B6}" type="datetimeFigureOut">
               <a:rPr lang="en-IN" smtClean="0"/>
-              <a:t>28-04-2020</a:t>
+              <a:t>04-05-2020</a:t>
             </a:fld>
             <a:endParaRPr lang="en-IN"/>
           </a:p>
@@ -2445,7 +2443,7 @@
           <a:p>
             <a:fld id="{4086692B-153F-4DFE-BFBD-A2AE2C7443B6}" type="datetimeFigureOut">
               <a:rPr lang="en-IN" smtClean="0"/>
-              <a:t>28-04-2020</a:t>
+              <a:t>04-05-2020</a:t>
             </a:fld>
             <a:endParaRPr lang="en-IN"/>
           </a:p>
@@ -2758,7 +2756,7 @@
           <a:p>
             <a:fld id="{4086692B-153F-4DFE-BFBD-A2AE2C7443B6}" type="datetimeFigureOut">
               <a:rPr lang="en-IN" smtClean="0"/>
-              <a:t>28-04-2020</a:t>
+              <a:t>04-05-2020</a:t>
             </a:fld>
             <a:endParaRPr lang="en-IN"/>
           </a:p>
@@ -3047,7 +3045,7 @@
           <a:p>
             <a:fld id="{4086692B-153F-4DFE-BFBD-A2AE2C7443B6}" type="datetimeFigureOut">
               <a:rPr lang="en-IN" smtClean="0"/>
-              <a:t>28-04-2020</a:t>
+              <a:t>04-05-2020</a:t>
             </a:fld>
             <a:endParaRPr lang="en-IN"/>
           </a:p>
@@ -3290,7 +3288,7 @@
           <a:p>
             <a:fld id="{4086692B-153F-4DFE-BFBD-A2AE2C7443B6}" type="datetimeFigureOut">
               <a:rPr lang="en-IN" smtClean="0"/>
-              <a:t>28-04-2020</a:t>
+              <a:t>04-05-2020</a:t>
             </a:fld>
             <a:endParaRPr lang="en-IN"/>
           </a:p>
@@ -4169,7 +4167,7 @@
         <p:spPr>
           <a:xfrm>
             <a:off x="838200" y="1779687"/>
-            <a:ext cx="10515600" cy="5078313"/>
+            <a:ext cx="10515600" cy="4801314"/>
           </a:xfrm>
           <a:prstGeom prst="rect">
             <a:avLst/>
@@ -4188,75 +4186,88 @@
                   <a:schemeClr val="bg1"/>
                 </a:solidFill>
               </a:rPr>
-              <a:t>Introduction to our Company Employee application</a:t>
-            </a:r>
-          </a:p>
-          <a:p>
-            <a:r>
-              <a:rPr lang="en-US" b="1" dirty="0">
-                <a:solidFill>
-                  <a:schemeClr val="bg1"/>
-                </a:solidFill>
-              </a:rPr>
-              <a:t>Breaking it down to microservices</a:t>
-            </a:r>
-          </a:p>
-          <a:p>
-            <a:r>
-              <a:rPr lang="en-US" b="1" dirty="0">
-                <a:solidFill>
-                  <a:schemeClr val="bg1"/>
-                </a:solidFill>
-              </a:rPr>
-              <a:t>	Implementation of Employee Microservices connecting to in memory database</a:t>
-            </a:r>
-          </a:p>
-          <a:p>
-            <a:r>
-              <a:rPr lang="en-US" b="1" dirty="0">
-                <a:solidFill>
-                  <a:schemeClr val="bg1"/>
-                </a:solidFill>
-              </a:rPr>
-              <a:t>	Implementation of Rating Microservices</a:t>
-            </a:r>
-          </a:p>
-          <a:p>
-            <a:r>
-              <a:rPr lang="en-US" b="1" dirty="0">
-                <a:solidFill>
-                  <a:schemeClr val="bg1"/>
-                </a:solidFill>
-              </a:rPr>
-              <a:t>	Implementation of a consolidating microservice</a:t>
-            </a:r>
-          </a:p>
-          <a:p>
-            <a:r>
-              <a:rPr lang="en-US" b="1" dirty="0">
-                <a:solidFill>
-                  <a:schemeClr val="bg1"/>
-                </a:solidFill>
-              </a:rPr>
-              <a:t>	Implementing custom function in DAO</a:t>
-            </a:r>
-          </a:p>
-          <a:p>
-            <a:r>
-              <a:rPr lang="en-US" b="1" dirty="0">
-                <a:solidFill>
-                  <a:schemeClr val="bg1"/>
-                </a:solidFill>
-              </a:rPr>
-              <a:t>	Spring boot actuator</a:t>
-            </a:r>
-          </a:p>
-          <a:p>
-            <a:endParaRPr lang="en-US" b="1" dirty="0">
-              <a:solidFill>
-                <a:schemeClr val="bg1"/>
-              </a:solidFill>
-            </a:endParaRPr>
+              <a:t>Implement the Customer-Employee-Rating microservices</a:t>
+            </a:r>
+          </a:p>
+          <a:p>
+            <a:r>
+              <a:rPr lang="en-US" b="1" dirty="0">
+                <a:solidFill>
+                  <a:schemeClr val="bg1"/>
+                </a:solidFill>
+              </a:rPr>
+              <a:t>Decomposition patterns</a:t>
+            </a:r>
+          </a:p>
+          <a:p>
+            <a:r>
+              <a:rPr lang="en-US" b="1" dirty="0">
+                <a:solidFill>
+                  <a:schemeClr val="bg1"/>
+                </a:solidFill>
+              </a:rPr>
+              <a:t>	Decompose by business capability</a:t>
+            </a:r>
+          </a:p>
+          <a:p>
+            <a:r>
+              <a:rPr lang="en-US" b="1" dirty="0">
+                <a:solidFill>
+                  <a:schemeClr val="bg1"/>
+                </a:solidFill>
+              </a:rPr>
+              <a:t>	Decompose by subdomain</a:t>
+            </a:r>
+          </a:p>
+          <a:p>
+            <a:r>
+              <a:rPr lang="en-US" b="1" dirty="0">
+                <a:solidFill>
+                  <a:schemeClr val="bg1"/>
+                </a:solidFill>
+              </a:rPr>
+              <a:t>Implementation of seed data.</a:t>
+            </a:r>
+          </a:p>
+          <a:p>
+            <a:r>
+              <a:rPr lang="en-US" b="1" dirty="0">
+                <a:solidFill>
+                  <a:schemeClr val="bg1"/>
+                </a:solidFill>
+              </a:rPr>
+              <a:t>Implementing customized function in DAO.	</a:t>
+            </a:r>
+          </a:p>
+          <a:p>
+            <a:r>
+              <a:rPr lang="en-US" b="1" dirty="0">
+                <a:solidFill>
+                  <a:schemeClr val="bg1"/>
+                </a:solidFill>
+              </a:rPr>
+              <a:t>Introduction to JPA</a:t>
+            </a:r>
+          </a:p>
+          <a:p>
+            <a:r>
+              <a:rPr lang="en-US" b="1" dirty="0">
+                <a:solidFill>
+                  <a:schemeClr val="bg1"/>
+                </a:solidFill>
+              </a:rPr>
+              <a:t>How DI makes the process very simple.</a:t>
+            </a:r>
+          </a:p>
+          <a:p>
+            <a:r>
+              <a:rPr lang="en-US" b="1" dirty="0">
+                <a:solidFill>
+                  <a:schemeClr val="bg1"/>
+                </a:solidFill>
+              </a:rPr>
+              <a:t>Spring Boot Actuator</a:t>
+            </a:r>
           </a:p>
           <a:p>
             <a:r>
@@ -4275,67 +4286,47 @@
                   <a:schemeClr val="bg1"/>
                 </a:solidFill>
               </a:rPr>
-              <a:t>Disadvantage with returning List</a:t>
-            </a:r>
-          </a:p>
-          <a:p>
-            <a:r>
-              <a:rPr lang="en-US" b="1" dirty="0">
-                <a:solidFill>
-                  <a:schemeClr val="bg1"/>
-                </a:solidFill>
-              </a:rPr>
-              <a:t>Introduction to Service Discovery</a:t>
-            </a:r>
-          </a:p>
-          <a:p>
-            <a:r>
-              <a:rPr lang="en-US" b="1" dirty="0">
-                <a:solidFill>
-                  <a:schemeClr val="bg1"/>
-                </a:solidFill>
-              </a:rPr>
-              <a:t>	Client side service discovery</a:t>
-            </a:r>
-          </a:p>
-          <a:p>
-            <a:r>
-              <a:rPr lang="en-US" b="1" dirty="0">
-                <a:solidFill>
-                  <a:schemeClr val="bg1"/>
-                </a:solidFill>
-              </a:rPr>
-              <a:t>		Eureka service</a:t>
-            </a:r>
-          </a:p>
-          <a:p>
-            <a:r>
-              <a:rPr lang="en-US" b="1" dirty="0">
-                <a:solidFill>
-                  <a:schemeClr val="bg1"/>
-                </a:solidFill>
-              </a:rPr>
-              <a:t>		Implementing service discovery with Eureka service</a:t>
-            </a:r>
-          </a:p>
-          <a:p>
-            <a:r>
-              <a:rPr lang="en-US" b="1" dirty="0">
-                <a:solidFill>
-                  <a:schemeClr val="bg1"/>
-                </a:solidFill>
-              </a:rPr>
-              <a:t>	Server side service discovery</a:t>
-            </a:r>
-          </a:p>
-          <a:p>
-            <a:r>
-              <a:rPr lang="en-US" b="1" dirty="0">
-                <a:solidFill>
-                  <a:schemeClr val="bg1"/>
-                </a:solidFill>
-              </a:rPr>
-              <a:t>		How Kubernetes does server side service discovery</a:t>
+              <a:t>Returning a custom object instead of List from Microservices</a:t>
+            </a:r>
+          </a:p>
+          <a:p>
+            <a:r>
+              <a:rPr lang="en-US" b="1" dirty="0">
+                <a:solidFill>
+                  <a:schemeClr val="bg1"/>
+                </a:solidFill>
+              </a:rPr>
+              <a:t>	Why?</a:t>
+            </a:r>
+          </a:p>
+          <a:p>
+            <a:r>
+              <a:rPr lang="en-US" b="1" dirty="0">
+                <a:solidFill>
+                  <a:schemeClr val="bg1"/>
+                </a:solidFill>
+              </a:rPr>
+              <a:t>Richardson Maturity Model</a:t>
+            </a:r>
+          </a:p>
+          <a:p>
+            <a:r>
+              <a:rPr lang="en-US" b="1" dirty="0">
+                <a:solidFill>
+                  <a:schemeClr val="bg1"/>
+                </a:solidFill>
+              </a:rPr>
+              <a:t>12 Factor applications</a:t>
+            </a:r>
+          </a:p>
+          <a:p>
+            <a:r>
+              <a:rPr lang="en-US" b="1" dirty="0">
+                <a:solidFill>
+                  <a:schemeClr val="bg1"/>
+                </a:solidFill>
+              </a:rPr>
+              <a:t>How Docker can participate</a:t>
             </a:r>
           </a:p>
           <a:p>
@@ -4457,7 +4448,7 @@
         <p:spPr>
           <a:xfrm>
             <a:off x="838200" y="1779687"/>
-            <a:ext cx="10515600" cy="3970318"/>
+            <a:ext cx="10515600" cy="4247317"/>
           </a:xfrm>
           <a:prstGeom prst="rect">
             <a:avLst/>
@@ -4476,131 +4467,107 @@
                   <a:schemeClr val="bg1"/>
                 </a:solidFill>
               </a:rPr>
-              <a:t>What is Cloud?</a:t>
-            </a:r>
-          </a:p>
-          <a:p>
-            <a:r>
-              <a:rPr lang="en-US" b="1" dirty="0">
-                <a:solidFill>
-                  <a:schemeClr val="bg1"/>
-                </a:solidFill>
-              </a:rPr>
-              <a:t>Migrating from Monolith to Microservices</a:t>
-            </a:r>
-          </a:p>
-          <a:p>
-            <a:r>
-              <a:rPr lang="en-US" b="1" dirty="0">
-                <a:solidFill>
-                  <a:schemeClr val="bg1"/>
-                </a:solidFill>
-              </a:rPr>
-              <a:t>Designing a microservice from scratch</a:t>
-            </a:r>
-          </a:p>
-          <a:p>
-            <a:r>
-              <a:rPr lang="en-US" b="1" dirty="0">
-                <a:solidFill>
-                  <a:schemeClr val="bg1"/>
-                </a:solidFill>
-              </a:rPr>
-              <a:t>Richardson Maturity Model</a:t>
-            </a:r>
-          </a:p>
-          <a:p>
-            <a:r>
-              <a:rPr lang="en-US" b="1" dirty="0">
-                <a:solidFill>
-                  <a:schemeClr val="bg1"/>
-                </a:solidFill>
-              </a:rPr>
-              <a:t>12 Factor applications</a:t>
-            </a:r>
-          </a:p>
-          <a:p>
-            <a:r>
-              <a:rPr lang="en-US" b="1" dirty="0">
-                <a:solidFill>
-                  <a:schemeClr val="bg1"/>
-                </a:solidFill>
-              </a:rPr>
-              <a:t>10 commandments of microservices</a:t>
-            </a:r>
-            <a:endParaRPr lang="en-US" dirty="0">
-              <a:solidFill>
-                <a:schemeClr val="bg1"/>
-              </a:solidFill>
-            </a:endParaRPr>
-          </a:p>
-          <a:p>
-            <a:r>
-              <a:rPr lang="en-US" b="1" dirty="0">
-                <a:solidFill>
-                  <a:schemeClr val="bg1"/>
-                </a:solidFill>
-              </a:rPr>
-              <a:t>Decomposition patterns</a:t>
-            </a:r>
-          </a:p>
-          <a:p>
-            <a:pPr lvl="1"/>
-            <a:r>
-              <a:rPr lang="en-US" b="1" dirty="0">
-                <a:solidFill>
-                  <a:schemeClr val="bg1"/>
-                </a:solidFill>
-              </a:rPr>
-              <a:t>Decompose by business capability</a:t>
-            </a:r>
-          </a:p>
-          <a:p>
-            <a:pPr lvl="1"/>
-            <a:r>
-              <a:rPr lang="en-US" b="1" dirty="0">
-                <a:solidFill>
-                  <a:schemeClr val="bg1"/>
-                </a:solidFill>
-              </a:rPr>
-              <a:t>Decompose by subdomain</a:t>
-            </a:r>
-            <a:endParaRPr lang="en-US" dirty="0">
-              <a:solidFill>
-                <a:schemeClr val="bg1"/>
-              </a:solidFill>
-            </a:endParaRPr>
-          </a:p>
-          <a:p>
-            <a:r>
-              <a:rPr lang="en-US" b="1" dirty="0">
-                <a:solidFill>
-                  <a:schemeClr val="bg1"/>
-                </a:solidFill>
-              </a:rPr>
-              <a:t>Testing patterns</a:t>
-            </a:r>
-          </a:p>
-          <a:p>
-            <a:pPr lvl="1"/>
-            <a:r>
-              <a:rPr lang="en-US" b="1" dirty="0">
-                <a:solidFill>
-                  <a:schemeClr val="bg1"/>
-                </a:solidFill>
-              </a:rPr>
-              <a:t>Junit 5</a:t>
-            </a:r>
-          </a:p>
-          <a:p>
-            <a:pPr lvl="1"/>
-            <a:r>
-              <a:rPr lang="en-US" b="1" dirty="0">
-                <a:solidFill>
-                  <a:schemeClr val="bg1"/>
-                </a:solidFill>
-              </a:rPr>
-              <a:t>Mockito</a:t>
+              <a:t>Introduction to Service Discovery</a:t>
+            </a:r>
+          </a:p>
+          <a:p>
+            <a:r>
+              <a:rPr lang="en-US" b="1" dirty="0">
+                <a:solidFill>
+                  <a:schemeClr val="bg1"/>
+                </a:solidFill>
+              </a:rPr>
+              <a:t>	Client side service discovery</a:t>
+            </a:r>
+          </a:p>
+          <a:p>
+            <a:r>
+              <a:rPr lang="en-US" b="1" dirty="0">
+                <a:solidFill>
+                  <a:schemeClr val="bg1"/>
+                </a:solidFill>
+              </a:rPr>
+              <a:t>		Eureka service</a:t>
+            </a:r>
+          </a:p>
+          <a:p>
+            <a:r>
+              <a:rPr lang="en-US" b="1" dirty="0">
+                <a:solidFill>
+                  <a:schemeClr val="bg1"/>
+                </a:solidFill>
+              </a:rPr>
+              <a:t>			Implementing the service discovery with Eureka</a:t>
+            </a:r>
+          </a:p>
+          <a:p>
+            <a:r>
+              <a:rPr lang="en-US" b="1" dirty="0">
+                <a:solidFill>
+                  <a:schemeClr val="bg1"/>
+                </a:solidFill>
+              </a:rPr>
+              <a:t>			Client side load balancing</a:t>
+            </a:r>
+          </a:p>
+          <a:p>
+            <a:r>
+              <a:rPr lang="en-US" b="1" dirty="0">
+                <a:solidFill>
+                  <a:schemeClr val="bg1"/>
+                </a:solidFill>
+              </a:rPr>
+              <a:t>		server side service discovery</a:t>
+            </a:r>
+          </a:p>
+          <a:p>
+            <a:r>
+              <a:rPr lang="en-US" b="1" dirty="0">
+                <a:solidFill>
+                  <a:schemeClr val="bg1"/>
+                </a:solidFill>
+              </a:rPr>
+              <a:t>			Docker/Kubernetes</a:t>
+            </a:r>
+          </a:p>
+          <a:p>
+            <a:r>
+              <a:rPr lang="en-US" b="1" dirty="0">
+                <a:solidFill>
+                  <a:schemeClr val="bg1"/>
+                </a:solidFill>
+              </a:rPr>
+              <a:t>				How Docker/Kubernetes does server side service discovery</a:t>
+            </a:r>
+          </a:p>
+          <a:p>
+            <a:r>
+              <a:rPr lang="en-US" b="1" dirty="0">
+                <a:solidFill>
+                  <a:schemeClr val="bg1"/>
+                </a:solidFill>
+              </a:rPr>
+              <a:t>Testing patterns: Service Component Test and Service Integration Contract Test</a:t>
+            </a:r>
+          </a:p>
+          <a:p>
+            <a:r>
+              <a:rPr lang="en-US" b="1" dirty="0">
+                <a:solidFill>
+                  <a:schemeClr val="bg1"/>
+                </a:solidFill>
+              </a:rPr>
+              <a:t>	Junit with Mockito</a:t>
+            </a:r>
+          </a:p>
+          <a:p>
+            <a:r>
+              <a:rPr lang="en-US" b="1" dirty="0">
+                <a:solidFill>
+                  <a:schemeClr val="bg1"/>
+                </a:solidFill>
+              </a:rPr>
+              <a:t>	Write a simple test using Mockito			</a:t>
             </a:r>
           </a:p>
           <a:p>
@@ -4614,7 +4581,14 @@
             </a:r>
           </a:p>
           <a:p>
-            <a:pPr lvl="1"/>
+            <a:r>
+              <a:rPr lang="en-US" b="1" dirty="0">
+                <a:solidFill>
+                  <a:schemeClr val="bg1"/>
+                </a:solidFill>
+              </a:rPr>
+              <a:t>	</a:t>
+            </a:r>
             <a:r>
               <a:rPr lang="en-US" b="1" dirty="0" err="1">
                 <a:solidFill>
@@ -4628,6 +4602,26 @@
                 <a:schemeClr val="bg1"/>
               </a:solidFill>
             </a:endParaRPr>
+          </a:p>
+          <a:p>
+            <a:r>
+              <a:rPr lang="en-US" b="1" dirty="0">
+                <a:solidFill>
+                  <a:schemeClr val="bg1"/>
+                </a:solidFill>
+              </a:rPr>
+              <a:t>Security </a:t>
+            </a:r>
+          </a:p>
+          <a:p>
+            <a:r>
+              <a:rPr lang="en-US" b="1" dirty="0">
+                <a:solidFill>
+                  <a:schemeClr val="bg1"/>
+                </a:solidFill>
+              </a:rPr>
+              <a:t>	Discuss security best practices for Docker and Microservices</a:t>
+            </a:r>
           </a:p>
         </p:txBody>
       </p:sp>
@@ -4731,7 +4725,7 @@
         <p:spPr>
           <a:xfrm>
             <a:off x="838200" y="1779687"/>
-            <a:ext cx="10515600" cy="5078313"/>
+            <a:ext cx="10515600" cy="4524315"/>
           </a:xfrm>
           <a:prstGeom prst="rect">
             <a:avLst/>
@@ -4760,47 +4754,47 @@
                   <a:schemeClr val="bg1"/>
                 </a:solidFill>
               </a:rPr>
-              <a:t>	Difference between Fault tolerance and resilience</a:t>
-            </a:r>
-          </a:p>
-          <a:p>
-            <a:r>
-              <a:rPr lang="en-US" b="1" dirty="0">
-                <a:solidFill>
-                  <a:schemeClr val="bg1"/>
-                </a:solidFill>
-              </a:rPr>
-              <a:t>	Fault tolerance related challenges with Microservices</a:t>
-            </a:r>
-          </a:p>
-          <a:p>
-            <a:r>
-              <a:rPr lang="en-US" b="1" dirty="0">
-                <a:solidFill>
-                  <a:schemeClr val="bg1"/>
-                </a:solidFill>
-              </a:rPr>
-              <a:t>	Implementing Timeout</a:t>
-            </a:r>
-          </a:p>
-          <a:p>
-            <a:r>
-              <a:rPr lang="en-US" b="1" dirty="0">
-                <a:solidFill>
-                  <a:schemeClr val="bg1"/>
-                </a:solidFill>
-              </a:rPr>
-              <a:t>	Implementing mimicked cached response</a:t>
-            </a:r>
-          </a:p>
-          <a:p>
-            <a:r>
-              <a:rPr lang="en-US" b="1" dirty="0">
-                <a:solidFill>
-                  <a:schemeClr val="bg1"/>
-                </a:solidFill>
-              </a:rPr>
-              <a:t>	Implement Circuit breaker pattern using </a:t>
+              <a:t>Difference between Fault tolerance and resilience</a:t>
+            </a:r>
+          </a:p>
+          <a:p>
+            <a:r>
+              <a:rPr lang="en-US" b="1" dirty="0">
+                <a:solidFill>
+                  <a:schemeClr val="bg1"/>
+                </a:solidFill>
+              </a:rPr>
+              <a:t>Fault tolerance related challenges with Microservices</a:t>
+            </a:r>
+          </a:p>
+          <a:p>
+            <a:r>
+              <a:rPr lang="en-US" b="1" dirty="0">
+                <a:solidFill>
+                  <a:schemeClr val="bg1"/>
+                </a:solidFill>
+              </a:rPr>
+              <a:t>Implementing Timeout</a:t>
+            </a:r>
+          </a:p>
+          <a:p>
+            <a:r>
+              <a:rPr lang="en-US" b="1" dirty="0">
+                <a:solidFill>
+                  <a:schemeClr val="bg1"/>
+                </a:solidFill>
+              </a:rPr>
+              <a:t>Implementing mimicked cached response</a:t>
+            </a:r>
+          </a:p>
+          <a:p>
+            <a:r>
+              <a:rPr lang="en-US" b="1" dirty="0">
+                <a:solidFill>
+                  <a:schemeClr val="bg1"/>
+                </a:solidFill>
+              </a:rPr>
+              <a:t>Implement Circuit breaker pattern using </a:t>
             </a:r>
             <a:r>
               <a:rPr lang="en-US" b="1" dirty="0" err="1">
@@ -4823,7 +4817,7 @@
                   <a:schemeClr val="bg1"/>
                 </a:solidFill>
               </a:rPr>
-              <a:t>	Mimic fault tolerance and verify that it is working.	</a:t>
+              <a:t>Mimic fault tolerance and verify that it is working.	</a:t>
             </a:r>
           </a:p>
           <a:p>
@@ -4853,7 +4847,7 @@
                   <a:schemeClr val="bg1"/>
                 </a:solidFill>
               </a:rPr>
-              <a:t>	</a:t>
+              <a:t>		</a:t>
             </a:r>
             <a:r>
               <a:rPr lang="en-US" b="1" dirty="0" err="1">
@@ -4876,48 +4870,8 @@
                   <a:schemeClr val="bg1"/>
                 </a:solidFill>
               </a:rPr>
-              <a:t>Implement a Spring MVC</a:t>
-            </a:r>
-          </a:p>
-          <a:p>
-            <a:r>
-              <a:rPr lang="en-US" b="1" dirty="0">
-                <a:solidFill>
-                  <a:schemeClr val="bg1"/>
-                </a:solidFill>
-              </a:rPr>
-              <a:t>	Display the data on the UI.	</a:t>
-            </a:r>
-          </a:p>
-          <a:p>
-            <a:endParaRPr lang="en-US" b="1" dirty="0">
-              <a:solidFill>
-                <a:schemeClr val="bg1"/>
-              </a:solidFill>
-            </a:endParaRPr>
-          </a:p>
-          <a:p>
-            <a:r>
-              <a:rPr lang="en-US" b="1" dirty="0">
-                <a:solidFill>
-                  <a:schemeClr val="bg1"/>
-                </a:solidFill>
-              </a:rPr>
-              <a:t>Project  Lombok and </a:t>
-            </a:r>
-            <a:r>
-              <a:rPr lang="en-US" b="1" dirty="0" err="1">
-                <a:solidFill>
-                  <a:schemeClr val="bg1"/>
-                </a:solidFill>
-              </a:rPr>
-              <a:t>MapStruct</a:t>
-            </a:r>
-            <a:endParaRPr lang="en-US" b="1" dirty="0">
-              <a:solidFill>
-                <a:schemeClr val="bg1"/>
-              </a:solidFill>
-            </a:endParaRPr>
+              <a:t>Project  Lombok</a:t>
+            </a:r>
           </a:p>
           <a:p>
             <a:r>
@@ -4947,6 +4901,16 @@
                 </a:solidFill>
               </a:rPr>
               <a:t>	Project Lombok Examples</a:t>
+            </a:r>
+          </a:p>
+          <a:p>
+            <a:r>
+              <a:rPr lang="en-US" b="1" dirty="0">
+                <a:solidFill>
+                  <a:schemeClr val="bg1"/>
+                </a:solidFill>
+              </a:rPr>
+              <a:t>Spring MVC</a:t>
             </a:r>
           </a:p>
           <a:p>
@@ -5061,7 +5025,7 @@
         <p:spPr>
           <a:xfrm>
             <a:off x="838200" y="1779687"/>
-            <a:ext cx="10515600" cy="3416320"/>
+            <a:ext cx="10515600" cy="2862322"/>
           </a:xfrm>
           <a:prstGeom prst="rect">
             <a:avLst/>
@@ -5180,27 +5144,7 @@
                   <a:schemeClr val="bg1"/>
                 </a:solidFill>
               </a:rPr>
-              <a:t>Debugging</a:t>
-            </a:r>
-          </a:p>
-          <a:p>
-            <a:r>
-              <a:rPr lang="en-US" b="1" dirty="0">
-                <a:solidFill>
-                  <a:schemeClr val="bg1"/>
-                </a:solidFill>
-              </a:rPr>
-              <a:t>	Simple debugging using SOP's</a:t>
-            </a:r>
-          </a:p>
-          <a:p>
-            <a:r>
-              <a:rPr lang="en-US" b="1" dirty="0">
-                <a:solidFill>
-                  <a:schemeClr val="bg1"/>
-                </a:solidFill>
-              </a:rPr>
-              <a:t>	Distributed tracing</a:t>
+              <a:t>Troubleshooting Spring Boot application</a:t>
             </a:r>
           </a:p>
         </p:txBody>
@@ -5209,540 +5153,6 @@
     <p:extLst>
       <p:ext uri="{BB962C8B-B14F-4D97-AF65-F5344CB8AC3E}">
         <p14:creationId xmlns:p14="http://schemas.microsoft.com/office/powerpoint/2010/main" val="1964403235"/>
-      </p:ext>
-    </p:extLst>
-  </p:cSld>
-  <p:clrMapOvr>
-    <a:masterClrMapping/>
-  </p:clrMapOvr>
-</p:sld>
-</file>
-
-<file path=ppt/slides/slide7.xml><?xml version="1.0" encoding="utf-8"?>
-<p:sld xmlns:a="http://schemas.openxmlformats.org/drawingml/2006/main" xmlns:r="http://schemas.openxmlformats.org/officeDocument/2006/relationships" xmlns:p="http://schemas.openxmlformats.org/presentationml/2006/main">
-  <p:cSld>
-    <p:bg>
-      <p:bgPr>
-        <a:solidFill>
-          <a:schemeClr val="tx2">
-            <a:lumMod val="60000"/>
-            <a:lumOff val="40000"/>
-          </a:schemeClr>
-        </a:solidFill>
-        <a:effectLst/>
-      </p:bgPr>
-    </p:bg>
-    <p:spTree>
-      <p:nvGrpSpPr>
-        <p:cNvPr id="1" name=""/>
-        <p:cNvGrpSpPr/>
-        <p:nvPr/>
-      </p:nvGrpSpPr>
-      <p:grpSpPr>
-        <a:xfrm>
-          <a:off x="0" y="0"/>
-          <a:ext cx="0" cy="0"/>
-          <a:chOff x="0" y="0"/>
-          <a:chExt cx="0" cy="0"/>
-        </a:xfrm>
-      </p:grpSpPr>
-      <p:sp>
-        <p:nvSpPr>
-          <p:cNvPr id="2" name="Title 1">
-            <a:extLst>
-              <a:ext uri="{FF2B5EF4-FFF2-40B4-BE49-F238E27FC236}">
-                <a16:creationId xmlns:a16="http://schemas.microsoft.com/office/drawing/2014/main" id="{51F2C05B-3556-493B-855C-1F19ADDBAF69}"/>
-              </a:ext>
-            </a:extLst>
-          </p:cNvPr>
-          <p:cNvSpPr>
-            <a:spLocks noGrp="1"/>
-          </p:cNvSpPr>
-          <p:nvPr>
-            <p:ph type="title"/>
-          </p:nvPr>
-        </p:nvSpPr>
-        <p:spPr>
-          <a:xfrm>
-            <a:off x="838200" y="365125"/>
-            <a:ext cx="11099104" cy="1325563"/>
-          </a:xfrm>
-        </p:spPr>
-        <p:txBody>
-          <a:bodyPr/>
-          <a:lstStyle/>
-          <a:p>
-            <a:r>
-              <a:rPr lang="en-US" dirty="0">
-                <a:solidFill>
-                  <a:schemeClr val="bg1"/>
-                </a:solidFill>
-                <a:latin typeface="+mn-lt"/>
-              </a:rPr>
-              <a:t> Day 1</a:t>
-            </a:r>
-            <a:endParaRPr lang="en-IN" dirty="0">
-              <a:solidFill>
-                <a:schemeClr val="bg1"/>
-              </a:solidFill>
-              <a:latin typeface="+mn-lt"/>
-            </a:endParaRPr>
-          </a:p>
-        </p:txBody>
-      </p:sp>
-      <p:sp>
-        <p:nvSpPr>
-          <p:cNvPr id="4" name="TextBox 3">
-            <a:extLst>
-              <a:ext uri="{FF2B5EF4-FFF2-40B4-BE49-F238E27FC236}">
-                <a16:creationId xmlns:a16="http://schemas.microsoft.com/office/drawing/2014/main" id="{A32609F5-383A-417E-B9B0-CE955463E2E4}"/>
-              </a:ext>
-            </a:extLst>
-          </p:cNvPr>
-          <p:cNvSpPr txBox="1"/>
-          <p:nvPr/>
-        </p:nvSpPr>
-        <p:spPr>
-          <a:xfrm>
-            <a:off x="838200" y="1779687"/>
-            <a:ext cx="10515600" cy="3970318"/>
-          </a:xfrm>
-          <a:prstGeom prst="rect">
-            <a:avLst/>
-          </a:prstGeom>
-          <a:noFill/>
-        </p:spPr>
-        <p:txBody>
-          <a:bodyPr wrap="square" rtlCol="0">
-            <a:spAutoFit/>
-          </a:bodyPr>
-          <a:lstStyle/>
-          <a:p>
-            <a:r>
-              <a:rPr lang="en-US" b="1" dirty="0">
-                <a:solidFill>
-                  <a:schemeClr val="bg1"/>
-                </a:solidFill>
-              </a:rPr>
-              <a:t>Dependency Injection and Inversion of Control</a:t>
-            </a:r>
-          </a:p>
-          <a:p>
-            <a:r>
-              <a:rPr lang="en-US" b="1" dirty="0">
-                <a:solidFill>
-                  <a:schemeClr val="bg1"/>
-                </a:solidFill>
-              </a:rPr>
-              <a:t>Microservices introduction</a:t>
-            </a:r>
-          </a:p>
-          <a:p>
-            <a:r>
-              <a:rPr lang="en-US" b="1" dirty="0">
-                <a:solidFill>
-                  <a:schemeClr val="bg1"/>
-                </a:solidFill>
-              </a:rPr>
-              <a:t>	Monolith Adv. And Dis adv.</a:t>
-            </a:r>
-          </a:p>
-          <a:p>
-            <a:r>
-              <a:rPr lang="en-US" b="1" dirty="0">
-                <a:solidFill>
-                  <a:schemeClr val="bg1"/>
-                </a:solidFill>
-              </a:rPr>
-              <a:t>	Defining characteristics of Microservices</a:t>
-            </a:r>
-          </a:p>
-          <a:p>
-            <a:r>
-              <a:rPr lang="en-US" b="1" dirty="0">
-                <a:solidFill>
-                  <a:schemeClr val="bg1"/>
-                </a:solidFill>
-              </a:rPr>
-              <a:t>	SOAP and REST</a:t>
-            </a:r>
-          </a:p>
-          <a:p>
-            <a:r>
-              <a:rPr lang="en-US" b="1" dirty="0">
-                <a:solidFill>
-                  <a:schemeClr val="bg1"/>
-                </a:solidFill>
-              </a:rPr>
-              <a:t>Spring Boot</a:t>
-            </a:r>
-          </a:p>
-          <a:p>
-            <a:r>
-              <a:rPr lang="en-US" b="1" dirty="0">
-                <a:solidFill>
-                  <a:schemeClr val="bg1"/>
-                </a:solidFill>
-              </a:rPr>
-              <a:t>	Why do you need Spring Boot</a:t>
-            </a:r>
-          </a:p>
-          <a:p>
-            <a:r>
-              <a:rPr lang="en-US" b="1" dirty="0">
-                <a:solidFill>
-                  <a:schemeClr val="bg1"/>
-                </a:solidFill>
-              </a:rPr>
-              <a:t>	Dev. Env. Setup</a:t>
-            </a:r>
-          </a:p>
-          <a:p>
-            <a:r>
-              <a:rPr lang="en-US" b="1" dirty="0">
-                <a:solidFill>
-                  <a:schemeClr val="bg1"/>
-                </a:solidFill>
-              </a:rPr>
-              <a:t>	Maven Introduction</a:t>
-            </a:r>
-          </a:p>
-          <a:p>
-            <a:r>
-              <a:rPr lang="en-US" b="1" dirty="0">
-                <a:solidFill>
-                  <a:schemeClr val="bg1"/>
-                </a:solidFill>
-              </a:rPr>
-              <a:t>	My first Spring Boot project</a:t>
-            </a:r>
-          </a:p>
-          <a:p>
-            <a:r>
-              <a:rPr lang="en-US" b="1" dirty="0">
-                <a:solidFill>
-                  <a:schemeClr val="bg1"/>
-                </a:solidFill>
-              </a:rPr>
-              <a:t>	My first </a:t>
-            </a:r>
-            <a:r>
-              <a:rPr lang="en-US" b="1" dirty="0" err="1">
-                <a:solidFill>
-                  <a:schemeClr val="bg1"/>
-                </a:solidFill>
-              </a:rPr>
-              <a:t>RestController</a:t>
-            </a:r>
-            <a:endParaRPr lang="en-US" b="1" dirty="0">
-              <a:solidFill>
-                <a:schemeClr val="bg1"/>
-              </a:solidFill>
-            </a:endParaRPr>
-          </a:p>
-          <a:p>
-            <a:r>
-              <a:rPr lang="en-US" b="1" dirty="0">
-                <a:solidFill>
-                  <a:schemeClr val="bg1"/>
-                </a:solidFill>
-              </a:rPr>
-              <a:t>HTTP basics</a:t>
-            </a:r>
-          </a:p>
-          <a:p>
-            <a:r>
-              <a:rPr lang="en-US" b="1" dirty="0">
-                <a:solidFill>
-                  <a:schemeClr val="bg1"/>
-                </a:solidFill>
-              </a:rPr>
-              <a:t>Postman basics</a:t>
-            </a:r>
-          </a:p>
-          <a:p>
-            <a:r>
-              <a:rPr lang="en-US" dirty="0">
-                <a:solidFill>
-                  <a:schemeClr val="bg1"/>
-                </a:solidFill>
-              </a:rPr>
-              <a:t>	</a:t>
-            </a:r>
-          </a:p>
-        </p:txBody>
-      </p:sp>
-    </p:spTree>
-    <p:extLst>
-      <p:ext uri="{BB962C8B-B14F-4D97-AF65-F5344CB8AC3E}">
-        <p14:creationId xmlns:p14="http://schemas.microsoft.com/office/powerpoint/2010/main" val="3688084364"/>
-      </p:ext>
-    </p:extLst>
-  </p:cSld>
-  <p:clrMapOvr>
-    <a:masterClrMapping/>
-  </p:clrMapOvr>
-</p:sld>
-</file>
-
-<file path=ppt/slides/slide8.xml><?xml version="1.0" encoding="utf-8"?>
-<p:sld xmlns:a="http://schemas.openxmlformats.org/drawingml/2006/main" xmlns:r="http://schemas.openxmlformats.org/officeDocument/2006/relationships" xmlns:p="http://schemas.openxmlformats.org/presentationml/2006/main">
-  <p:cSld>
-    <p:bg>
-      <p:bgPr>
-        <a:solidFill>
-          <a:schemeClr val="tx2">
-            <a:lumMod val="60000"/>
-            <a:lumOff val="40000"/>
-          </a:schemeClr>
-        </a:solidFill>
-        <a:effectLst/>
-      </p:bgPr>
-    </p:bg>
-    <p:spTree>
-      <p:nvGrpSpPr>
-        <p:cNvPr id="1" name=""/>
-        <p:cNvGrpSpPr/>
-        <p:nvPr/>
-      </p:nvGrpSpPr>
-      <p:grpSpPr>
-        <a:xfrm>
-          <a:off x="0" y="0"/>
-          <a:ext cx="0" cy="0"/>
-          <a:chOff x="0" y="0"/>
-          <a:chExt cx="0" cy="0"/>
-        </a:xfrm>
-      </p:grpSpPr>
-      <p:sp>
-        <p:nvSpPr>
-          <p:cNvPr id="2" name="Title 1">
-            <a:extLst>
-              <a:ext uri="{FF2B5EF4-FFF2-40B4-BE49-F238E27FC236}">
-                <a16:creationId xmlns:a16="http://schemas.microsoft.com/office/drawing/2014/main" id="{51F2C05B-3556-493B-855C-1F19ADDBAF69}"/>
-              </a:ext>
-            </a:extLst>
-          </p:cNvPr>
-          <p:cNvSpPr>
-            <a:spLocks noGrp="1"/>
-          </p:cNvSpPr>
-          <p:nvPr>
-            <p:ph type="title"/>
-          </p:nvPr>
-        </p:nvSpPr>
-        <p:spPr>
-          <a:xfrm>
-            <a:off x="838200" y="365125"/>
-            <a:ext cx="11099104" cy="1325563"/>
-          </a:xfrm>
-        </p:spPr>
-        <p:txBody>
-          <a:bodyPr/>
-          <a:lstStyle/>
-          <a:p>
-            <a:r>
-              <a:rPr lang="en-US" dirty="0">
-                <a:solidFill>
-                  <a:schemeClr val="bg1"/>
-                </a:solidFill>
-                <a:latin typeface="+mn-lt"/>
-              </a:rPr>
-              <a:t> Day 1</a:t>
-            </a:r>
-            <a:endParaRPr lang="en-IN" dirty="0">
-              <a:solidFill>
-                <a:schemeClr val="bg1"/>
-              </a:solidFill>
-              <a:latin typeface="+mn-lt"/>
-            </a:endParaRPr>
-          </a:p>
-        </p:txBody>
-      </p:sp>
-      <p:sp>
-        <p:nvSpPr>
-          <p:cNvPr id="4" name="TextBox 3">
-            <a:extLst>
-              <a:ext uri="{FF2B5EF4-FFF2-40B4-BE49-F238E27FC236}">
-                <a16:creationId xmlns:a16="http://schemas.microsoft.com/office/drawing/2014/main" id="{A32609F5-383A-417E-B9B0-CE955463E2E4}"/>
-              </a:ext>
-            </a:extLst>
-          </p:cNvPr>
-          <p:cNvSpPr txBox="1"/>
-          <p:nvPr/>
-        </p:nvSpPr>
-        <p:spPr>
-          <a:xfrm>
-            <a:off x="838200" y="1779687"/>
-            <a:ext cx="10515600" cy="3970318"/>
-          </a:xfrm>
-          <a:prstGeom prst="rect">
-            <a:avLst/>
-          </a:prstGeom>
-          <a:noFill/>
-        </p:spPr>
-        <p:txBody>
-          <a:bodyPr wrap="square" rtlCol="0">
-            <a:spAutoFit/>
-          </a:bodyPr>
-          <a:lstStyle/>
-          <a:p>
-            <a:r>
-              <a:rPr lang="en-US" b="1" dirty="0">
-                <a:solidFill>
-                  <a:schemeClr val="bg1"/>
-                </a:solidFill>
-              </a:rPr>
-              <a:t>Dependency Injection and Inversion of Control</a:t>
-            </a:r>
-          </a:p>
-          <a:p>
-            <a:r>
-              <a:rPr lang="en-US" b="1" dirty="0">
-                <a:solidFill>
-                  <a:schemeClr val="bg1"/>
-                </a:solidFill>
-              </a:rPr>
-              <a:t>Microservices introduction</a:t>
-            </a:r>
-          </a:p>
-          <a:p>
-            <a:r>
-              <a:rPr lang="en-US" b="1" dirty="0">
-                <a:solidFill>
-                  <a:schemeClr val="bg1"/>
-                </a:solidFill>
-              </a:rPr>
-              <a:t>	Monolith Adv. And Dis adv.</a:t>
-            </a:r>
-          </a:p>
-          <a:p>
-            <a:r>
-              <a:rPr lang="en-US" b="1" dirty="0">
-                <a:solidFill>
-                  <a:schemeClr val="bg1"/>
-                </a:solidFill>
-              </a:rPr>
-              <a:t>	Defining characteristics of Microservices</a:t>
-            </a:r>
-          </a:p>
-          <a:p>
-            <a:r>
-              <a:rPr lang="en-US" b="1" dirty="0">
-                <a:solidFill>
-                  <a:schemeClr val="bg1"/>
-                </a:solidFill>
-              </a:rPr>
-              <a:t>	SOAP and REST</a:t>
-            </a:r>
-          </a:p>
-          <a:p>
-            <a:r>
-              <a:rPr lang="en-US" b="1" dirty="0">
-                <a:solidFill>
-                  <a:schemeClr val="bg1"/>
-                </a:solidFill>
-              </a:rPr>
-              <a:t>Spring Boot</a:t>
-            </a:r>
-          </a:p>
-          <a:p>
-            <a:r>
-              <a:rPr lang="en-US" b="1" dirty="0">
-                <a:solidFill>
-                  <a:schemeClr val="bg1"/>
-                </a:solidFill>
-              </a:rPr>
-              <a:t>	Why do you need Spring Boot</a:t>
-            </a:r>
-          </a:p>
-          <a:p>
-            <a:r>
-              <a:rPr lang="en-US" b="1" dirty="0">
-                <a:solidFill>
-                  <a:schemeClr val="bg1"/>
-                </a:solidFill>
-              </a:rPr>
-              <a:t>	Dev. Env. Setup</a:t>
-            </a:r>
-          </a:p>
-          <a:p>
-            <a:r>
-              <a:rPr lang="en-US" b="1" dirty="0">
-                <a:solidFill>
-                  <a:schemeClr val="bg1"/>
-                </a:solidFill>
-              </a:rPr>
-              <a:t>	Maven Introduction</a:t>
-            </a:r>
-          </a:p>
-          <a:p>
-            <a:r>
-              <a:rPr lang="en-US" b="1" dirty="0">
-                <a:solidFill>
-                  <a:schemeClr val="bg1"/>
-                </a:solidFill>
-              </a:rPr>
-              <a:t>	My first Spring Boot project</a:t>
-            </a:r>
-          </a:p>
-          <a:p>
-            <a:r>
-              <a:rPr lang="en-US" b="1" dirty="0">
-                <a:solidFill>
-                  <a:schemeClr val="bg1"/>
-                </a:solidFill>
-              </a:rPr>
-              <a:t>	My first </a:t>
-            </a:r>
-            <a:r>
-              <a:rPr lang="en-US" b="1" dirty="0" err="1">
-                <a:solidFill>
-                  <a:schemeClr val="bg1"/>
-                </a:solidFill>
-              </a:rPr>
-              <a:t>RestController</a:t>
-            </a:r>
-            <a:endParaRPr lang="en-US" b="1" dirty="0">
-              <a:solidFill>
-                <a:schemeClr val="bg1"/>
-              </a:solidFill>
-            </a:endParaRPr>
-          </a:p>
-          <a:p>
-            <a:r>
-              <a:rPr lang="en-US" b="1" dirty="0">
-                <a:solidFill>
-                  <a:schemeClr val="bg1"/>
-                </a:solidFill>
-              </a:rPr>
-              <a:t>HTTP basics</a:t>
-            </a:r>
-          </a:p>
-          <a:p>
-            <a:r>
-              <a:rPr lang="en-US" b="1" dirty="0">
-                <a:solidFill>
-                  <a:schemeClr val="bg1"/>
-                </a:solidFill>
-              </a:rPr>
-              <a:t>Postman basics</a:t>
-            </a:r>
-          </a:p>
-          <a:p>
-            <a:r>
-              <a:rPr lang="en-US" dirty="0">
-                <a:solidFill>
-                  <a:schemeClr val="bg1"/>
-                </a:solidFill>
-              </a:rPr>
-              <a:t>	</a:t>
-            </a:r>
-          </a:p>
-        </p:txBody>
-      </p:sp>
-    </p:spTree>
-    <p:extLst>
-      <p:ext uri="{BB962C8B-B14F-4D97-AF65-F5344CB8AC3E}">
-        <p14:creationId xmlns:p14="http://schemas.microsoft.com/office/powerpoint/2010/main" val="4281533968"/>
       </p:ext>
     </p:extLst>
   </p:cSld>

</xml_diff>